<commit_message>
Animationen auf meiner ersten Folie
</commit_message>
<xml_diff>
--- a/Präsi_Konzept.pptx
+++ b/Präsi_Konzept.pptx
@@ -4783,6 +4783,374 @@
     <a:masterClrMapping/>
   </p:clrMapOvr>
   <p:transition/>
+  <p:timing>
+    <p:tnLst>
+      <p:par>
+        <p:cTn id="1" dur="indefinite" restart="never" nodeType="tmRoot">
+          <p:childTnLst>
+            <p:seq concurrent="1" nextAc="seek">
+              <p:cTn id="2" dur="indefinite" nodeType="mainSeq">
+                <p:childTnLst>
+                  <p:par>
+                    <p:cTn id="3" fill="hold">
+                      <p:stCondLst>
+                        <p:cond delay="indefinite"/>
+                      </p:stCondLst>
+                      <p:childTnLst>
+                        <p:par>
+                          <p:cTn id="4" fill="hold">
+                            <p:stCondLst>
+                              <p:cond delay="0"/>
+                            </p:stCondLst>
+                            <p:childTnLst>
+                              <p:par>
+                                <p:cTn id="5" presetID="1" presetClass="entr" presetSubtype="0" fill="hold" nodeType="clickEffect">
+                                  <p:stCondLst>
+                                    <p:cond delay="0"/>
+                                  </p:stCondLst>
+                                  <p:childTnLst>
+                                    <p:set>
+                                      <p:cBhvr>
+                                        <p:cTn id="6" dur="1" fill="hold">
+                                          <p:stCondLst>
+                                            <p:cond delay="0"/>
+                                          </p:stCondLst>
+                                        </p:cTn>
+                                        <p:tgtEl>
+                                          <p:spTgt spid="3">
+                                            <p:txEl>
+                                              <p:pRg st="0" end="0"/>
+                                            </p:txEl>
+                                          </p:spTgt>
+                                        </p:tgtEl>
+                                        <p:attrNameLst>
+                                          <p:attrName>style.visibility</p:attrName>
+                                        </p:attrNameLst>
+                                      </p:cBhvr>
+                                      <p:to>
+                                        <p:strVal val="visible"/>
+                                      </p:to>
+                                    </p:set>
+                                  </p:childTnLst>
+                                </p:cTn>
+                              </p:par>
+                            </p:childTnLst>
+                          </p:cTn>
+                        </p:par>
+                      </p:childTnLst>
+                    </p:cTn>
+                  </p:par>
+                  <p:par>
+                    <p:cTn id="7" fill="hold">
+                      <p:stCondLst>
+                        <p:cond delay="indefinite"/>
+                      </p:stCondLst>
+                      <p:childTnLst>
+                        <p:par>
+                          <p:cTn id="8" fill="hold">
+                            <p:stCondLst>
+                              <p:cond delay="0"/>
+                            </p:stCondLst>
+                            <p:childTnLst>
+                              <p:par>
+                                <p:cTn id="9" presetID="1" presetClass="entr" presetSubtype="0" fill="hold" nodeType="clickEffect">
+                                  <p:stCondLst>
+                                    <p:cond delay="0"/>
+                                  </p:stCondLst>
+                                  <p:childTnLst>
+                                    <p:set>
+                                      <p:cBhvr>
+                                        <p:cTn id="10" dur="1" fill="hold">
+                                          <p:stCondLst>
+                                            <p:cond delay="0"/>
+                                          </p:stCondLst>
+                                        </p:cTn>
+                                        <p:tgtEl>
+                                          <p:spTgt spid="3">
+                                            <p:txEl>
+                                              <p:pRg st="1" end="1"/>
+                                            </p:txEl>
+                                          </p:spTgt>
+                                        </p:tgtEl>
+                                        <p:attrNameLst>
+                                          <p:attrName>style.visibility</p:attrName>
+                                        </p:attrNameLst>
+                                      </p:cBhvr>
+                                      <p:to>
+                                        <p:strVal val="visible"/>
+                                      </p:to>
+                                    </p:set>
+                                  </p:childTnLst>
+                                </p:cTn>
+                              </p:par>
+                              <p:par>
+                                <p:cTn id="11" presetID="1" presetClass="entr" presetSubtype="0" fill="hold" nodeType="withEffect">
+                                  <p:stCondLst>
+                                    <p:cond delay="0"/>
+                                  </p:stCondLst>
+                                  <p:childTnLst>
+                                    <p:set>
+                                      <p:cBhvr>
+                                        <p:cTn id="12" dur="1" fill="hold">
+                                          <p:stCondLst>
+                                            <p:cond delay="0"/>
+                                          </p:stCondLst>
+                                        </p:cTn>
+                                        <p:tgtEl>
+                                          <p:spTgt spid="3">
+                                            <p:txEl>
+                                              <p:pRg st="2" end="2"/>
+                                            </p:txEl>
+                                          </p:spTgt>
+                                        </p:tgtEl>
+                                        <p:attrNameLst>
+                                          <p:attrName>style.visibility</p:attrName>
+                                        </p:attrNameLst>
+                                      </p:cBhvr>
+                                      <p:to>
+                                        <p:strVal val="visible"/>
+                                      </p:to>
+                                    </p:set>
+                                  </p:childTnLst>
+                                </p:cTn>
+                              </p:par>
+                            </p:childTnLst>
+                          </p:cTn>
+                        </p:par>
+                      </p:childTnLst>
+                    </p:cTn>
+                  </p:par>
+                  <p:par>
+                    <p:cTn id="13" fill="hold">
+                      <p:stCondLst>
+                        <p:cond delay="indefinite"/>
+                      </p:stCondLst>
+                      <p:childTnLst>
+                        <p:par>
+                          <p:cTn id="14" fill="hold">
+                            <p:stCondLst>
+                              <p:cond delay="0"/>
+                            </p:stCondLst>
+                            <p:childTnLst>
+                              <p:par>
+                                <p:cTn id="15" presetID="1" presetClass="entr" presetSubtype="0" fill="hold" nodeType="clickEffect">
+                                  <p:stCondLst>
+                                    <p:cond delay="0"/>
+                                  </p:stCondLst>
+                                  <p:childTnLst>
+                                    <p:set>
+                                      <p:cBhvr>
+                                        <p:cTn id="16" dur="1" fill="hold">
+                                          <p:stCondLst>
+                                            <p:cond delay="0"/>
+                                          </p:stCondLst>
+                                        </p:cTn>
+                                        <p:tgtEl>
+                                          <p:spTgt spid="3">
+                                            <p:txEl>
+                                              <p:pRg st="3" end="3"/>
+                                            </p:txEl>
+                                          </p:spTgt>
+                                        </p:tgtEl>
+                                        <p:attrNameLst>
+                                          <p:attrName>style.visibility</p:attrName>
+                                        </p:attrNameLst>
+                                      </p:cBhvr>
+                                      <p:to>
+                                        <p:strVal val="visible"/>
+                                      </p:to>
+                                    </p:set>
+                                  </p:childTnLst>
+                                </p:cTn>
+                              </p:par>
+                            </p:childTnLst>
+                          </p:cTn>
+                        </p:par>
+                      </p:childTnLst>
+                    </p:cTn>
+                  </p:par>
+                  <p:par>
+                    <p:cTn id="17" fill="hold">
+                      <p:stCondLst>
+                        <p:cond delay="indefinite"/>
+                      </p:stCondLst>
+                      <p:childTnLst>
+                        <p:par>
+                          <p:cTn id="18" fill="hold">
+                            <p:stCondLst>
+                              <p:cond delay="0"/>
+                            </p:stCondLst>
+                            <p:childTnLst>
+                              <p:par>
+                                <p:cTn id="19" presetID="1" presetClass="entr" presetSubtype="0" fill="hold" nodeType="clickEffect">
+                                  <p:stCondLst>
+                                    <p:cond delay="0"/>
+                                  </p:stCondLst>
+                                  <p:childTnLst>
+                                    <p:set>
+                                      <p:cBhvr>
+                                        <p:cTn id="20" dur="1" fill="hold">
+                                          <p:stCondLst>
+                                            <p:cond delay="0"/>
+                                          </p:stCondLst>
+                                        </p:cTn>
+                                        <p:tgtEl>
+                                          <p:spTgt spid="3">
+                                            <p:txEl>
+                                              <p:pRg st="4" end="4"/>
+                                            </p:txEl>
+                                          </p:spTgt>
+                                        </p:tgtEl>
+                                        <p:attrNameLst>
+                                          <p:attrName>style.visibility</p:attrName>
+                                        </p:attrNameLst>
+                                      </p:cBhvr>
+                                      <p:to>
+                                        <p:strVal val="visible"/>
+                                      </p:to>
+                                    </p:set>
+                                  </p:childTnLst>
+                                </p:cTn>
+                              </p:par>
+                              <p:par>
+                                <p:cTn id="21" presetID="1" presetClass="entr" presetSubtype="0" fill="hold" nodeType="withEffect">
+                                  <p:stCondLst>
+                                    <p:cond delay="0"/>
+                                  </p:stCondLst>
+                                  <p:childTnLst>
+                                    <p:set>
+                                      <p:cBhvr>
+                                        <p:cTn id="22" dur="1" fill="hold">
+                                          <p:stCondLst>
+                                            <p:cond delay="0"/>
+                                          </p:stCondLst>
+                                        </p:cTn>
+                                        <p:tgtEl>
+                                          <p:spTgt spid="3">
+                                            <p:txEl>
+                                              <p:pRg st="5" end="5"/>
+                                            </p:txEl>
+                                          </p:spTgt>
+                                        </p:tgtEl>
+                                        <p:attrNameLst>
+                                          <p:attrName>style.visibility</p:attrName>
+                                        </p:attrNameLst>
+                                      </p:cBhvr>
+                                      <p:to>
+                                        <p:strVal val="visible"/>
+                                      </p:to>
+                                    </p:set>
+                                  </p:childTnLst>
+                                </p:cTn>
+                              </p:par>
+                              <p:par>
+                                <p:cTn id="23" presetID="1" presetClass="entr" presetSubtype="0" fill="hold" nodeType="withEffect">
+                                  <p:stCondLst>
+                                    <p:cond delay="0"/>
+                                  </p:stCondLst>
+                                  <p:childTnLst>
+                                    <p:set>
+                                      <p:cBhvr>
+                                        <p:cTn id="24" dur="1" fill="hold">
+                                          <p:stCondLst>
+                                            <p:cond delay="0"/>
+                                          </p:stCondLst>
+                                        </p:cTn>
+                                        <p:tgtEl>
+                                          <p:spTgt spid="3">
+                                            <p:txEl>
+                                              <p:pRg st="6" end="6"/>
+                                            </p:txEl>
+                                          </p:spTgt>
+                                        </p:tgtEl>
+                                        <p:attrNameLst>
+                                          <p:attrName>style.visibility</p:attrName>
+                                        </p:attrNameLst>
+                                      </p:cBhvr>
+                                      <p:to>
+                                        <p:strVal val="visible"/>
+                                      </p:to>
+                                    </p:set>
+                                  </p:childTnLst>
+                                </p:cTn>
+                              </p:par>
+                            </p:childTnLst>
+                          </p:cTn>
+                        </p:par>
+                      </p:childTnLst>
+                    </p:cTn>
+                  </p:par>
+                  <p:par>
+                    <p:cTn id="25" fill="hold">
+                      <p:stCondLst>
+                        <p:cond delay="indefinite"/>
+                      </p:stCondLst>
+                      <p:childTnLst>
+                        <p:par>
+                          <p:cTn id="26" fill="hold">
+                            <p:stCondLst>
+                              <p:cond delay="0"/>
+                            </p:stCondLst>
+                            <p:childTnLst>
+                              <p:par>
+                                <p:cTn id="27" presetID="1" presetClass="entr" presetSubtype="0" fill="hold" nodeType="clickEffect">
+                                  <p:stCondLst>
+                                    <p:cond delay="0"/>
+                                  </p:stCondLst>
+                                  <p:childTnLst>
+                                    <p:set>
+                                      <p:cBhvr>
+                                        <p:cTn id="28" dur="1" fill="hold">
+                                          <p:stCondLst>
+                                            <p:cond delay="0"/>
+                                          </p:stCondLst>
+                                        </p:cTn>
+                                        <p:tgtEl>
+                                          <p:spTgt spid="3">
+                                            <p:txEl>
+                                              <p:pRg st="7" end="7"/>
+                                            </p:txEl>
+                                          </p:spTgt>
+                                        </p:tgtEl>
+                                        <p:attrNameLst>
+                                          <p:attrName>style.visibility</p:attrName>
+                                        </p:attrNameLst>
+                                      </p:cBhvr>
+                                      <p:to>
+                                        <p:strVal val="visible"/>
+                                      </p:to>
+                                    </p:set>
+                                  </p:childTnLst>
+                                </p:cTn>
+                              </p:par>
+                            </p:childTnLst>
+                          </p:cTn>
+                        </p:par>
+                      </p:childTnLst>
+                    </p:cTn>
+                  </p:par>
+                </p:childTnLst>
+              </p:cTn>
+              <p:prevCondLst>
+                <p:cond evt="onPrev" delay="0">
+                  <p:tgtEl>
+                    <p:sldTgt/>
+                  </p:tgtEl>
+                </p:cond>
+              </p:prevCondLst>
+              <p:nextCondLst>
+                <p:cond evt="onNext" delay="0">
+                  <p:tgtEl>
+                    <p:sldTgt/>
+                  </p:tgtEl>
+                </p:cond>
+              </p:nextCondLst>
+            </p:seq>
+          </p:childTnLst>
+        </p:cTn>
+      </p:par>
+    </p:tnLst>
+  </p:timing>
 </p:sld>
 </file>
 

</xml_diff>

<commit_message>
Parkplätze in Präsi versetzt
</commit_message>
<xml_diff>
--- a/Präsi_Konzept.pptx
+++ b/Präsi_Konzept.pptx
@@ -2773,6 +2773,16 @@
               </a:rPr>
               <a:t> Gewerk 2</a:t>
             </a:r>
+            <a:r>
+              <a:rPr lang="en-US" dirty="0">
+                <a:solidFill>
+                  <a:schemeClr val="tx1"/>
+                </a:solidFill>
+                <a:latin typeface="+mj-ea"/>
+                <a:cs typeface="+mj-ea"/>
+              </a:rPr>
+              <a:t/>
+            </a:r>
             <a:br>
               <a:rPr lang="en-US" dirty="0">
                 <a:solidFill>
@@ -2817,6 +2827,14 @@
                 <a:spcPct val="90000"/>
               </a:lnSpc>
             </a:pPr>
+            <a:r>
+              <a:rPr lang="en-US" dirty="0">
+                <a:solidFill>
+                  <a:schemeClr val="tx1"/>
+                </a:solidFill>
+              </a:rPr>
+              <a:t/>
+            </a:r>
             <a:br>
               <a:rPr lang="en-US" dirty="0">
                 <a:solidFill>
@@ -2959,7 +2977,7 @@
           <p:cNvPr id="4" name="Grafik 3">
             <a:extLst>
               <a:ext uri="{FF2B5EF4-FFF2-40B4-BE49-F238E27FC236}">
-                <a16:creationId xmlns:a16="http://schemas.microsoft.com/office/drawing/2014/main" id="{E8FD4E4A-4BD4-441B-A6FB-F1DF917A54FF}"/>
+                <a16:creationId xmlns:a16="http://schemas.microsoft.com/office/drawing/2014/main" xmlns="" id="{E8FD4E4A-4BD4-441B-A6FB-F1DF917A54FF}"/>
               </a:ext>
             </a:extLst>
           </p:cNvPr>
@@ -2995,7 +3013,7 @@
           <p:cNvPr id="6" name="Grafik 5">
             <a:extLst>
               <a:ext uri="{FF2B5EF4-FFF2-40B4-BE49-F238E27FC236}">
-                <a16:creationId xmlns:a16="http://schemas.microsoft.com/office/drawing/2014/main" id="{2FAA14AD-2BD0-4AB6-B784-D2821EEA1036}"/>
+                <a16:creationId xmlns:a16="http://schemas.microsoft.com/office/drawing/2014/main" xmlns="" id="{2FAA14AD-2BD0-4AB6-B784-D2821EEA1036}"/>
               </a:ext>
             </a:extLst>
           </p:cNvPr>
@@ -3032,6 +3050,13 @@
     <a:masterClrMapping/>
   </p:clrMapOvr>
   <p:transition/>
+  <p:timing>
+    <p:tnLst>
+      <p:par>
+        <p:cTn id="1" dur="indefinite" restart="never" nodeType="tmRoot"/>
+      </p:par>
+    </p:tnLst>
+  </p:timing>
 </p:sld>
 </file>
 
@@ -3057,7 +3082,7 @@
           <p:cNvPr id="2" name="Titel 1">
             <a:extLst>
               <a:ext uri="{FF2B5EF4-FFF2-40B4-BE49-F238E27FC236}">
-                <a16:creationId xmlns:a16="http://schemas.microsoft.com/office/drawing/2014/main" id="{68942DE7-0CD4-4006-B961-3A46331D13B7}"/>
+                <a16:creationId xmlns:a16="http://schemas.microsoft.com/office/drawing/2014/main" xmlns="" id="{68942DE7-0CD4-4006-B961-3A46331D13B7}"/>
               </a:ext>
             </a:extLst>
           </p:cNvPr>
@@ -3103,7 +3128,7 @@
           <p:cNvPr id="3" name="Inhaltsplatzhalter 2">
             <a:extLst>
               <a:ext uri="{FF2B5EF4-FFF2-40B4-BE49-F238E27FC236}">
-                <a16:creationId xmlns:a16="http://schemas.microsoft.com/office/drawing/2014/main" id="{2443D015-FBE5-4C25-8718-8719D6560D39}"/>
+                <a16:creationId xmlns:a16="http://schemas.microsoft.com/office/drawing/2014/main" xmlns="" id="{2443D015-FBE5-4C25-8718-8719D6560D39}"/>
               </a:ext>
             </a:extLst>
           </p:cNvPr>
@@ -3134,7 +3159,7 @@
           <p:cNvPr id="4" name="Fußzeilenplatzhalter 3">
             <a:extLst>
               <a:ext uri="{FF2B5EF4-FFF2-40B4-BE49-F238E27FC236}">
-                <a16:creationId xmlns:a16="http://schemas.microsoft.com/office/drawing/2014/main" id="{EAA1F0E0-8D52-48F0-B1B5-68B6926C079D}"/>
+                <a16:creationId xmlns:a16="http://schemas.microsoft.com/office/drawing/2014/main" xmlns="" id="{EAA1F0E0-8D52-48F0-B1B5-68B6926C079D}"/>
               </a:ext>
             </a:extLst>
           </p:cNvPr>
@@ -3174,7 +3199,7 @@
           <p:cNvPr id="5" name="Foliennummernplatzhalter 4">
             <a:extLst>
               <a:ext uri="{FF2B5EF4-FFF2-40B4-BE49-F238E27FC236}">
-                <a16:creationId xmlns:a16="http://schemas.microsoft.com/office/drawing/2014/main" id="{3247F105-89DD-4C3A-AC5F-FB6BBF6B145D}"/>
+                <a16:creationId xmlns:a16="http://schemas.microsoft.com/office/drawing/2014/main" xmlns="" id="{3247F105-89DD-4C3A-AC5F-FB6BBF6B145D}"/>
               </a:ext>
             </a:extLst>
           </p:cNvPr>
@@ -3247,6 +3272,13 @@
     <a:masterClrMapping/>
   </p:clrMapOvr>
   <p:transition/>
+  <p:timing>
+    <p:tnLst>
+      <p:par>
+        <p:cTn id="1" dur="indefinite" restart="never" nodeType="tmRoot"/>
+      </p:par>
+    </p:tnLst>
+  </p:timing>
 </p:sld>
 </file>
 
@@ -3272,7 +3304,7 @@
           <p:cNvPr id="2" name="Titel 1">
             <a:extLst>
               <a:ext uri="{FF2B5EF4-FFF2-40B4-BE49-F238E27FC236}">
-                <a16:creationId xmlns:a16="http://schemas.microsoft.com/office/drawing/2014/main" id="{5954DD7E-3280-47A4-8C9D-6081CE36C0A6}"/>
+                <a16:creationId xmlns:a16="http://schemas.microsoft.com/office/drawing/2014/main" xmlns="" id="{5954DD7E-3280-47A4-8C9D-6081CE36C0A6}"/>
               </a:ext>
             </a:extLst>
           </p:cNvPr>
@@ -3307,7 +3339,7 @@
           <p:cNvPr id="4" name="Fußzeilenplatzhalter 3">
             <a:extLst>
               <a:ext uri="{FF2B5EF4-FFF2-40B4-BE49-F238E27FC236}">
-                <a16:creationId xmlns:a16="http://schemas.microsoft.com/office/drawing/2014/main" id="{E590B8B1-8557-49AA-B432-2531581CEE8B}"/>
+                <a16:creationId xmlns:a16="http://schemas.microsoft.com/office/drawing/2014/main" xmlns="" id="{E590B8B1-8557-49AA-B432-2531581CEE8B}"/>
               </a:ext>
             </a:extLst>
           </p:cNvPr>
@@ -3347,7 +3379,7 @@
           <p:cNvPr id="5" name="Foliennummernplatzhalter 4">
             <a:extLst>
               <a:ext uri="{FF2B5EF4-FFF2-40B4-BE49-F238E27FC236}">
-                <a16:creationId xmlns:a16="http://schemas.microsoft.com/office/drawing/2014/main" id="{E04210D6-6F3F-4AEF-9054-A77C73630F5C}"/>
+                <a16:creationId xmlns:a16="http://schemas.microsoft.com/office/drawing/2014/main" xmlns="" id="{E04210D6-6F3F-4AEF-9054-A77C73630F5C}"/>
               </a:ext>
             </a:extLst>
           </p:cNvPr>
@@ -3384,7 +3416,7 @@
           <p:cNvPr id="6" name="Inhaltsplatzhalter 5">
             <a:extLst>
               <a:ext uri="{FF2B5EF4-FFF2-40B4-BE49-F238E27FC236}">
-                <a16:creationId xmlns:a16="http://schemas.microsoft.com/office/drawing/2014/main" id="{E5812B95-984C-44D1-A861-D3A5496C39AA}"/>
+                <a16:creationId xmlns:a16="http://schemas.microsoft.com/office/drawing/2014/main" xmlns="" id="{E5812B95-984C-44D1-A861-D3A5496C39AA}"/>
               </a:ext>
             </a:extLst>
           </p:cNvPr>
@@ -3428,6 +3460,13 @@
     <a:masterClrMapping/>
   </p:clrMapOvr>
   <p:transition/>
+  <p:timing>
+    <p:tnLst>
+      <p:par>
+        <p:cTn id="1" dur="indefinite" restart="never" nodeType="tmRoot"/>
+      </p:par>
+    </p:tnLst>
+  </p:timing>
 </p:sld>
 </file>
 
@@ -3453,7 +3492,7 @@
           <p:cNvPr id="2" name="Titel 1">
             <a:extLst>
               <a:ext uri="{FF2B5EF4-FFF2-40B4-BE49-F238E27FC236}">
-                <a16:creationId xmlns:a16="http://schemas.microsoft.com/office/drawing/2014/main" id="{199E0412-C9C1-4338-AF11-254B58531795}"/>
+                <a16:creationId xmlns:a16="http://schemas.microsoft.com/office/drawing/2014/main" xmlns="" id="{199E0412-C9C1-4338-AF11-254B58531795}"/>
               </a:ext>
             </a:extLst>
           </p:cNvPr>
@@ -3482,7 +3521,7 @@
           <p:cNvPr id="3" name="Inhaltsplatzhalter 2">
             <a:extLst>
               <a:ext uri="{FF2B5EF4-FFF2-40B4-BE49-F238E27FC236}">
-                <a16:creationId xmlns:a16="http://schemas.microsoft.com/office/drawing/2014/main" id="{C398954B-85C0-425D-A3DF-8844D64D05F0}"/>
+                <a16:creationId xmlns:a16="http://schemas.microsoft.com/office/drawing/2014/main" xmlns="" id="{C398954B-85C0-425D-A3DF-8844D64D05F0}"/>
               </a:ext>
             </a:extLst>
           </p:cNvPr>
@@ -3611,7 +3650,7 @@
           <p:cNvPr id="4" name="Fußzeilenplatzhalter 3">
             <a:extLst>
               <a:ext uri="{FF2B5EF4-FFF2-40B4-BE49-F238E27FC236}">
-                <a16:creationId xmlns:a16="http://schemas.microsoft.com/office/drawing/2014/main" id="{CF38E57F-8951-4C6C-808C-D512836D4D27}"/>
+                <a16:creationId xmlns:a16="http://schemas.microsoft.com/office/drawing/2014/main" xmlns="" id="{CF38E57F-8951-4C6C-808C-D512836D4D27}"/>
               </a:ext>
             </a:extLst>
           </p:cNvPr>
@@ -3651,7 +3690,7 @@
           <p:cNvPr id="5" name="Foliennummernplatzhalter 4">
             <a:extLst>
               <a:ext uri="{FF2B5EF4-FFF2-40B4-BE49-F238E27FC236}">
-                <a16:creationId xmlns:a16="http://schemas.microsoft.com/office/drawing/2014/main" id="{DF2B7CFB-9EDB-41B2-98FF-80F53662EB29}"/>
+                <a16:creationId xmlns:a16="http://schemas.microsoft.com/office/drawing/2014/main" xmlns="" id="{DF2B7CFB-9EDB-41B2-98FF-80F53662EB29}"/>
               </a:ext>
             </a:extLst>
           </p:cNvPr>
@@ -3694,6 +3733,13 @@
     <a:masterClrMapping/>
   </p:clrMapOvr>
   <p:transition/>
+  <p:timing>
+    <p:tnLst>
+      <p:par>
+        <p:cTn id="1" dur="indefinite" restart="never" nodeType="tmRoot"/>
+      </p:par>
+    </p:tnLst>
+  </p:timing>
 </p:sld>
 </file>
 
@@ -3719,7 +3765,7 @@
           <p:cNvPr id="2" name="Titel 1">
             <a:extLst>
               <a:ext uri="{FF2B5EF4-FFF2-40B4-BE49-F238E27FC236}">
-                <a16:creationId xmlns:a16="http://schemas.microsoft.com/office/drawing/2014/main" id="{059E98A5-A252-4A2B-9244-F09A4570DB00}"/>
+                <a16:creationId xmlns:a16="http://schemas.microsoft.com/office/drawing/2014/main" xmlns="" id="{059E98A5-A252-4A2B-9244-F09A4570DB00}"/>
               </a:ext>
             </a:extLst>
           </p:cNvPr>
@@ -3745,6 +3791,16 @@
               </a:rPr>
               <a:t>Einführung</a:t>
             </a:r>
+            <a:r>
+              <a:rPr lang="en-US" dirty="0">
+                <a:solidFill>
+                  <a:schemeClr val="tx1"/>
+                </a:solidFill>
+                <a:latin typeface="+mj-ea"/>
+                <a:cs typeface="+mj-ea"/>
+              </a:rPr>
+              <a:t/>
+            </a:r>
             <a:br>
               <a:rPr lang="en-US" dirty="0">
                 <a:solidFill>
@@ -3771,7 +3827,7 @@
               <p:cNvPr id="3" name="Inhaltsplatzhalter 2">
                 <a:extLst>
                   <a:ext uri="{FF2B5EF4-FFF2-40B4-BE49-F238E27FC236}">
-                    <a16:creationId xmlns:a16="http://schemas.microsoft.com/office/drawing/2014/main" id="{48A4D262-E3D1-4A7C-8EE6-E7A520B0C393}"/>
+                    <a16:creationId xmlns:a16="http://schemas.microsoft.com/office/drawing/2014/main" xmlns="" id="{48A4D262-E3D1-4A7C-8EE6-E7A520B0C393}"/>
                   </a:ext>
                 </a:extLst>
               </p:cNvPr>
@@ -4700,7 +4756,7 @@
           <p:cNvPr id="4" name="Fußzeilenplatzhalter 3">
             <a:extLst>
               <a:ext uri="{FF2B5EF4-FFF2-40B4-BE49-F238E27FC236}">
-                <a16:creationId xmlns:a16="http://schemas.microsoft.com/office/drawing/2014/main" id="{150F77BD-78BB-49B2-BE4E-4B6DE3612D25}"/>
+                <a16:creationId xmlns:a16="http://schemas.microsoft.com/office/drawing/2014/main" xmlns="" id="{150F77BD-78BB-49B2-BE4E-4B6DE3612D25}"/>
               </a:ext>
             </a:extLst>
           </p:cNvPr>
@@ -4740,7 +4796,7 @@
           <p:cNvPr id="5" name="Foliennummernplatzhalter 4">
             <a:extLst>
               <a:ext uri="{FF2B5EF4-FFF2-40B4-BE49-F238E27FC236}">
-                <a16:creationId xmlns:a16="http://schemas.microsoft.com/office/drawing/2014/main" id="{9893842A-01CE-4CCA-B5C7-495C7783652C}"/>
+                <a16:creationId xmlns:a16="http://schemas.microsoft.com/office/drawing/2014/main" xmlns="" id="{9893842A-01CE-4CCA-B5C7-495C7783652C}"/>
               </a:ext>
             </a:extLst>
           </p:cNvPr>
@@ -5176,7 +5232,7 @@
           <p:cNvPr id="2" name="Titel 1">
             <a:extLst>
               <a:ext uri="{FF2B5EF4-FFF2-40B4-BE49-F238E27FC236}">
-                <a16:creationId xmlns:a16="http://schemas.microsoft.com/office/drawing/2014/main" id="{1002C0B3-54CE-4942-AECD-0AF05A31659B}"/>
+                <a16:creationId xmlns:a16="http://schemas.microsoft.com/office/drawing/2014/main" xmlns="" id="{1002C0B3-54CE-4942-AECD-0AF05A31659B}"/>
               </a:ext>
             </a:extLst>
           </p:cNvPr>
@@ -5216,7 +5272,7 @@
           <p:cNvPr id="4" name="Fußzeilenplatzhalter 3">
             <a:extLst>
               <a:ext uri="{FF2B5EF4-FFF2-40B4-BE49-F238E27FC236}">
-                <a16:creationId xmlns:a16="http://schemas.microsoft.com/office/drawing/2014/main" id="{1172C0F9-7EFD-4242-97CE-2B73B45733F4}"/>
+                <a16:creationId xmlns:a16="http://schemas.microsoft.com/office/drawing/2014/main" xmlns="" id="{1172C0F9-7EFD-4242-97CE-2B73B45733F4}"/>
               </a:ext>
             </a:extLst>
           </p:cNvPr>
@@ -5256,7 +5312,7 @@
           <p:cNvPr id="5" name="Foliennummernplatzhalter 4">
             <a:extLst>
               <a:ext uri="{FF2B5EF4-FFF2-40B4-BE49-F238E27FC236}">
-                <a16:creationId xmlns:a16="http://schemas.microsoft.com/office/drawing/2014/main" id="{2AC17D0B-DB4B-4FF8-8B4A-D568E264BDC4}"/>
+                <a16:creationId xmlns:a16="http://schemas.microsoft.com/office/drawing/2014/main" xmlns="" id="{2AC17D0B-DB4B-4FF8-8B4A-D568E264BDC4}"/>
               </a:ext>
             </a:extLst>
           </p:cNvPr>
@@ -5293,7 +5349,7 @@
           <p:cNvPr id="6" name="Inhaltsplatzhalter 6">
             <a:extLst>
               <a:ext uri="{FF2B5EF4-FFF2-40B4-BE49-F238E27FC236}">
-                <a16:creationId xmlns:a16="http://schemas.microsoft.com/office/drawing/2014/main" id="{06C85739-5674-44EE-A608-9C5F17D15B0B}"/>
+                <a16:creationId xmlns:a16="http://schemas.microsoft.com/office/drawing/2014/main" xmlns="" id="{06C85739-5674-44EE-A608-9C5F17D15B0B}"/>
               </a:ext>
             </a:extLst>
           </p:cNvPr>
@@ -5333,6 +5389,13 @@
     <a:masterClrMapping/>
   </p:clrMapOvr>
   <p:transition/>
+  <p:timing>
+    <p:tnLst>
+      <p:par>
+        <p:cTn id="1" dur="indefinite" restart="never" nodeType="tmRoot"/>
+      </p:par>
+    </p:tnLst>
+  </p:timing>
 </p:sld>
 </file>
 
@@ -5358,7 +5421,7 @@
           <p:cNvPr id="2" name="Titel 1">
             <a:extLst>
               <a:ext uri="{FF2B5EF4-FFF2-40B4-BE49-F238E27FC236}">
-                <a16:creationId xmlns:a16="http://schemas.microsoft.com/office/drawing/2014/main" id="{A98656BE-B570-47D5-BDA5-7D30AEE1B8DA}"/>
+                <a16:creationId xmlns:a16="http://schemas.microsoft.com/office/drawing/2014/main" xmlns="" id="{A98656BE-B570-47D5-BDA5-7D30AEE1B8DA}"/>
               </a:ext>
             </a:extLst>
           </p:cNvPr>
@@ -5393,7 +5456,7 @@
           <p:cNvPr id="4" name="Fußzeilenplatzhalter 3">
             <a:extLst>
               <a:ext uri="{FF2B5EF4-FFF2-40B4-BE49-F238E27FC236}">
-                <a16:creationId xmlns:a16="http://schemas.microsoft.com/office/drawing/2014/main" id="{EB93C187-F383-4DA1-BB87-0BA5117AA5BA}"/>
+                <a16:creationId xmlns:a16="http://schemas.microsoft.com/office/drawing/2014/main" xmlns="" id="{EB93C187-F383-4DA1-BB87-0BA5117AA5BA}"/>
               </a:ext>
             </a:extLst>
           </p:cNvPr>
@@ -5433,7 +5496,7 @@
           <p:cNvPr id="5" name="Foliennummernplatzhalter 4">
             <a:extLst>
               <a:ext uri="{FF2B5EF4-FFF2-40B4-BE49-F238E27FC236}">
-                <a16:creationId xmlns:a16="http://schemas.microsoft.com/office/drawing/2014/main" id="{391E6A47-105A-448E-84B3-EB326BF13B84}"/>
+                <a16:creationId xmlns:a16="http://schemas.microsoft.com/office/drawing/2014/main" xmlns="" id="{391E6A47-105A-448E-84B3-EB326BF13B84}"/>
               </a:ext>
             </a:extLst>
           </p:cNvPr>
@@ -5470,7 +5533,7 @@
           <p:cNvPr id="6" name="Inhaltsplatzhalter 6">
             <a:extLst>
               <a:ext uri="{FF2B5EF4-FFF2-40B4-BE49-F238E27FC236}">
-                <a16:creationId xmlns:a16="http://schemas.microsoft.com/office/drawing/2014/main" id="{0EEA831B-BDEE-4233-B932-9ABEA11759E2}"/>
+                <a16:creationId xmlns:a16="http://schemas.microsoft.com/office/drawing/2014/main" xmlns="" id="{0EEA831B-BDEE-4233-B932-9ABEA11759E2}"/>
               </a:ext>
             </a:extLst>
           </p:cNvPr>
@@ -5510,6 +5573,13 @@
     <a:masterClrMapping/>
   </p:clrMapOvr>
   <p:transition/>
+  <p:timing>
+    <p:tnLst>
+      <p:par>
+        <p:cTn id="1" dur="indefinite" restart="never" nodeType="tmRoot"/>
+      </p:par>
+    </p:tnLst>
+  </p:timing>
 </p:sld>
 </file>
 
@@ -5535,7 +5605,7 @@
           <p:cNvPr id="2" name="Titel 1">
             <a:extLst>
               <a:ext uri="{FF2B5EF4-FFF2-40B4-BE49-F238E27FC236}">
-                <a16:creationId xmlns:a16="http://schemas.microsoft.com/office/drawing/2014/main" id="{E0C48783-44F0-49B1-91DF-746F77EC058D}"/>
+                <a16:creationId xmlns:a16="http://schemas.microsoft.com/office/drawing/2014/main" xmlns="" id="{E0C48783-44F0-49B1-91DF-746F77EC058D}"/>
               </a:ext>
             </a:extLst>
           </p:cNvPr>
@@ -5561,6 +5631,16 @@
               </a:rPr>
               <a:t>Konzept</a:t>
             </a:r>
+            <a:r>
+              <a:rPr lang="en-US" dirty="0">
+                <a:solidFill>
+                  <a:schemeClr val="tx1"/>
+                </a:solidFill>
+                <a:latin typeface="+mj-ea"/>
+                <a:cs typeface="+mj-ea"/>
+              </a:rPr>
+              <a:t/>
+            </a:r>
             <a:br>
               <a:rPr lang="en-US" dirty="0">
                 <a:solidFill>
@@ -5585,7 +5665,7 @@
           <p:cNvPr id="3" name="Inhaltsplatzhalter 2">
             <a:extLst>
               <a:ext uri="{FF2B5EF4-FFF2-40B4-BE49-F238E27FC236}">
-                <a16:creationId xmlns:a16="http://schemas.microsoft.com/office/drawing/2014/main" id="{30474B77-0BBF-4449-8ED8-4290E9952962}"/>
+                <a16:creationId xmlns:a16="http://schemas.microsoft.com/office/drawing/2014/main" xmlns="" id="{30474B77-0BBF-4449-8ED8-4290E9952962}"/>
               </a:ext>
             </a:extLst>
           </p:cNvPr>
@@ -5810,7 +5890,7 @@
           <p:cNvPr id="4" name="Fußzeilenplatzhalter 3">
             <a:extLst>
               <a:ext uri="{FF2B5EF4-FFF2-40B4-BE49-F238E27FC236}">
-                <a16:creationId xmlns:a16="http://schemas.microsoft.com/office/drawing/2014/main" id="{D05208BD-8364-4FBE-98F6-FADE0698EEC8}"/>
+                <a16:creationId xmlns:a16="http://schemas.microsoft.com/office/drawing/2014/main" xmlns="" id="{D05208BD-8364-4FBE-98F6-FADE0698EEC8}"/>
               </a:ext>
             </a:extLst>
           </p:cNvPr>
@@ -5850,7 +5930,7 @@
           <p:cNvPr id="5" name="Foliennummernplatzhalter 4">
             <a:extLst>
               <a:ext uri="{FF2B5EF4-FFF2-40B4-BE49-F238E27FC236}">
-                <a16:creationId xmlns:a16="http://schemas.microsoft.com/office/drawing/2014/main" id="{3508CB09-B7DF-4961-AF99-F98497007B99}"/>
+                <a16:creationId xmlns:a16="http://schemas.microsoft.com/office/drawing/2014/main" xmlns="" id="{3508CB09-B7DF-4961-AF99-F98497007B99}"/>
               </a:ext>
             </a:extLst>
           </p:cNvPr>
@@ -5893,6 +5973,13 @@
     <a:masterClrMapping/>
   </p:clrMapOvr>
   <p:transition/>
+  <p:timing>
+    <p:tnLst>
+      <p:par>
+        <p:cTn id="1" dur="indefinite" restart="never" nodeType="tmRoot"/>
+      </p:par>
+    </p:tnLst>
+  </p:timing>
 </p:sld>
 </file>
 
@@ -5918,7 +6005,7 @@
           <p:cNvPr id="2" name="Titel 1">
             <a:extLst>
               <a:ext uri="{FF2B5EF4-FFF2-40B4-BE49-F238E27FC236}">
-                <a16:creationId xmlns:a16="http://schemas.microsoft.com/office/drawing/2014/main" id="{27550AB3-6952-4775-833E-DC990A492641}"/>
+                <a16:creationId xmlns:a16="http://schemas.microsoft.com/office/drawing/2014/main" xmlns="" id="{27550AB3-6952-4775-833E-DC990A492641}"/>
               </a:ext>
             </a:extLst>
           </p:cNvPr>
@@ -5944,6 +6031,16 @@
               </a:rPr>
               <a:t>Konzept</a:t>
             </a:r>
+            <a:r>
+              <a:rPr lang="en-US" dirty="0">
+                <a:solidFill>
+                  <a:schemeClr val="tx1"/>
+                </a:solidFill>
+                <a:latin typeface="+mj-ea"/>
+                <a:cs typeface="+mj-ea"/>
+              </a:rPr>
+              <a:t/>
+            </a:r>
             <a:br>
               <a:rPr lang="en-US" dirty="0">
                 <a:solidFill>
@@ -5968,7 +6065,7 @@
           <p:cNvPr id="3" name="Inhaltsplatzhalter 2">
             <a:extLst>
               <a:ext uri="{FF2B5EF4-FFF2-40B4-BE49-F238E27FC236}">
-                <a16:creationId xmlns:a16="http://schemas.microsoft.com/office/drawing/2014/main" id="{14596503-A67F-4B1F-B152-27CBB750E3A8}"/>
+                <a16:creationId xmlns:a16="http://schemas.microsoft.com/office/drawing/2014/main" xmlns="" id="{14596503-A67F-4B1F-B152-27CBB750E3A8}"/>
               </a:ext>
             </a:extLst>
           </p:cNvPr>
@@ -6184,7 +6281,7 @@
           <p:cNvPr id="4" name="Fußzeilenplatzhalter 3">
             <a:extLst>
               <a:ext uri="{FF2B5EF4-FFF2-40B4-BE49-F238E27FC236}">
-                <a16:creationId xmlns:a16="http://schemas.microsoft.com/office/drawing/2014/main" id="{0BA4DECC-89B5-4564-B3C6-BACCCEE9E91D}"/>
+                <a16:creationId xmlns:a16="http://schemas.microsoft.com/office/drawing/2014/main" xmlns="" id="{0BA4DECC-89B5-4564-B3C6-BACCCEE9E91D}"/>
               </a:ext>
             </a:extLst>
           </p:cNvPr>
@@ -6224,7 +6321,7 @@
           <p:cNvPr id="5" name="Foliennummernplatzhalter 4">
             <a:extLst>
               <a:ext uri="{FF2B5EF4-FFF2-40B4-BE49-F238E27FC236}">
-                <a16:creationId xmlns:a16="http://schemas.microsoft.com/office/drawing/2014/main" id="{04785371-51E6-40C6-B09A-2DB691D50DCE}"/>
+                <a16:creationId xmlns:a16="http://schemas.microsoft.com/office/drawing/2014/main" xmlns="" id="{04785371-51E6-40C6-B09A-2DB691D50DCE}"/>
               </a:ext>
             </a:extLst>
           </p:cNvPr>
@@ -6267,6 +6364,13 @@
     <a:masterClrMapping/>
   </p:clrMapOvr>
   <p:transition/>
+  <p:timing>
+    <p:tnLst>
+      <p:par>
+        <p:cTn id="1" dur="indefinite" restart="never" nodeType="tmRoot"/>
+      </p:par>
+    </p:tnLst>
+  </p:timing>
 </p:sld>
 </file>
 
@@ -6292,7 +6396,7 @@
           <p:cNvPr id="2" name="Titel 1">
             <a:extLst>
               <a:ext uri="{FF2B5EF4-FFF2-40B4-BE49-F238E27FC236}">
-                <a16:creationId xmlns:a16="http://schemas.microsoft.com/office/drawing/2014/main" id="{27550AB3-6952-4775-833E-DC990A492641}"/>
+                <a16:creationId xmlns:a16="http://schemas.microsoft.com/office/drawing/2014/main" xmlns="" id="{27550AB3-6952-4775-833E-DC990A492641}"/>
               </a:ext>
             </a:extLst>
           </p:cNvPr>
@@ -6318,6 +6422,16 @@
               </a:rPr>
               <a:t>Konzept</a:t>
             </a:r>
+            <a:r>
+              <a:rPr lang="en-US" dirty="0">
+                <a:solidFill>
+                  <a:schemeClr val="tx1"/>
+                </a:solidFill>
+                <a:latin typeface="+mj-ea"/>
+                <a:cs typeface="+mj-ea"/>
+              </a:rPr>
+              <a:t/>
+            </a:r>
             <a:br>
               <a:rPr lang="en-US" dirty="0">
                 <a:solidFill>
@@ -6337,41 +6451,12 @@
           </a:p>
         </p:txBody>
       </p:sp>
-      <p:pic>
-        <p:nvPicPr>
-          <p:cNvPr id="6" name="Inhaltsplatzhalter 5"/>
-          <p:cNvPicPr>
-            <a:picLocks noGrp="1" noChangeAspect="1"/>
-          </p:cNvPicPr>
-          <p:nvPr>
-            <p:ph idx="1"/>
-          </p:nvPr>
-        </p:nvPicPr>
-        <p:blipFill>
-          <a:blip r:embed="rId2">
-            <a:extLst>
-              <a:ext uri="{28A0092B-C50C-407E-A947-70E740481C1C}">
-                <a14:useLocalDpi xmlns:a14="http://schemas.microsoft.com/office/drawing/2010/main" val="0"/>
-              </a:ext>
-            </a:extLst>
-          </a:blip>
-          <a:stretch>
-            <a:fillRect/>
-          </a:stretch>
-        </p:blipFill>
-        <p:spPr>
-          <a:xfrm>
-            <a:off x="280987" y="1279265"/>
-            <a:ext cx="9344025" cy="4875733"/>
-          </a:xfrm>
-        </p:spPr>
-      </p:pic>
       <p:sp>
         <p:nvSpPr>
           <p:cNvPr id="4" name="Fußzeilenplatzhalter 3">
             <a:extLst>
               <a:ext uri="{FF2B5EF4-FFF2-40B4-BE49-F238E27FC236}">
-                <a16:creationId xmlns:a16="http://schemas.microsoft.com/office/drawing/2014/main" id="{0BA4DECC-89B5-4564-B3C6-BACCCEE9E91D}"/>
+                <a16:creationId xmlns:a16="http://schemas.microsoft.com/office/drawing/2014/main" xmlns="" id="{0BA4DECC-89B5-4564-B3C6-BACCCEE9E91D}"/>
               </a:ext>
             </a:extLst>
           </p:cNvPr>
@@ -6411,7 +6496,7 @@
           <p:cNvPr id="5" name="Foliennummernplatzhalter 4">
             <a:extLst>
               <a:ext uri="{FF2B5EF4-FFF2-40B4-BE49-F238E27FC236}">
-                <a16:creationId xmlns:a16="http://schemas.microsoft.com/office/drawing/2014/main" id="{04785371-51E6-40C6-B09A-2DB691D50DCE}"/>
+                <a16:creationId xmlns:a16="http://schemas.microsoft.com/office/drawing/2014/main" xmlns="" id="{04785371-51E6-40C6-B09A-2DB691D50DCE}"/>
               </a:ext>
             </a:extLst>
           </p:cNvPr>
@@ -6443,6 +6528,32 @@
           </a:p>
         </p:txBody>
       </p:sp>
+      <p:pic>
+        <p:nvPicPr>
+          <p:cNvPr id="7" name="Inhaltsplatzhalter 6"/>
+          <p:cNvPicPr>
+            <a:picLocks noGrp="1" noChangeAspect="1"/>
+          </p:cNvPicPr>
+          <p:nvPr>
+            <p:ph idx="1"/>
+          </p:nvPr>
+        </p:nvPicPr>
+        <p:blipFill>
+          <a:blip r:embed="rId2"/>
+          <a:stretch>
+            <a:fillRect/>
+          </a:stretch>
+        </p:blipFill>
+        <p:spPr>
+          <a:xfrm>
+            <a:off x="320675" y="1312185"/>
+            <a:ext cx="9344025" cy="4886093"/>
+          </a:xfrm>
+          <a:prstGeom prst="rect">
+            <a:avLst/>
+          </a:prstGeom>
+        </p:spPr>
+      </p:pic>
     </p:spTree>
     <p:extLst>
       <p:ext uri="{BB962C8B-B14F-4D97-AF65-F5344CB8AC3E}">
@@ -6454,6 +6565,13 @@
     <a:masterClrMapping/>
   </p:clrMapOvr>
   <p:transition/>
+  <p:timing>
+    <p:tnLst>
+      <p:par>
+        <p:cTn id="1" dur="indefinite" restart="never" nodeType="tmRoot"/>
+      </p:par>
+    </p:tnLst>
+  </p:timing>
 </p:sld>
 </file>
 
@@ -6479,7 +6597,7 @@
           <p:cNvPr id="2" name="Titel 1">
             <a:extLst>
               <a:ext uri="{FF2B5EF4-FFF2-40B4-BE49-F238E27FC236}">
-                <a16:creationId xmlns:a16="http://schemas.microsoft.com/office/drawing/2014/main" id="{68942DE7-0CD4-4006-B961-3A46331D13B7}"/>
+                <a16:creationId xmlns:a16="http://schemas.microsoft.com/office/drawing/2014/main" xmlns="" id="{68942DE7-0CD4-4006-B961-3A46331D13B7}"/>
               </a:ext>
             </a:extLst>
           </p:cNvPr>
@@ -6526,41 +6644,12 @@
           </a:p>
         </p:txBody>
       </p:sp>
-      <p:pic>
-        <p:nvPicPr>
-          <p:cNvPr id="7" name="Inhaltsplatzhalter 6"/>
-          <p:cNvPicPr>
-            <a:picLocks noGrp="1" noChangeAspect="1"/>
-          </p:cNvPicPr>
-          <p:nvPr>
-            <p:ph idx="1"/>
-          </p:nvPr>
-        </p:nvPicPr>
-        <p:blipFill>
-          <a:blip r:embed="rId2">
-            <a:extLst>
-              <a:ext uri="{28A0092B-C50C-407E-A947-70E740481C1C}">
-                <a14:useLocalDpi xmlns:a14="http://schemas.microsoft.com/office/drawing/2010/main" val="0"/>
-              </a:ext>
-            </a:extLst>
-          </a:blip>
-          <a:stretch>
-            <a:fillRect/>
-          </a:stretch>
-        </p:blipFill>
-        <p:spPr>
-          <a:xfrm>
-            <a:off x="390259" y="1273175"/>
-            <a:ext cx="9204857" cy="4964113"/>
-          </a:xfrm>
-        </p:spPr>
-      </p:pic>
       <p:sp>
         <p:nvSpPr>
           <p:cNvPr id="4" name="Fußzeilenplatzhalter 3">
             <a:extLst>
               <a:ext uri="{FF2B5EF4-FFF2-40B4-BE49-F238E27FC236}">
-                <a16:creationId xmlns:a16="http://schemas.microsoft.com/office/drawing/2014/main" id="{EAA1F0E0-8D52-48F0-B1B5-68B6926C079D}"/>
+                <a16:creationId xmlns:a16="http://schemas.microsoft.com/office/drawing/2014/main" xmlns="" id="{EAA1F0E0-8D52-48F0-B1B5-68B6926C079D}"/>
               </a:ext>
             </a:extLst>
           </p:cNvPr>
@@ -6600,7 +6689,7 @@
           <p:cNvPr id="5" name="Foliennummernplatzhalter 4">
             <a:extLst>
               <a:ext uri="{FF2B5EF4-FFF2-40B4-BE49-F238E27FC236}">
-                <a16:creationId xmlns:a16="http://schemas.microsoft.com/office/drawing/2014/main" id="{3247F105-89DD-4C3A-AC5F-FB6BBF6B145D}"/>
+                <a16:creationId xmlns:a16="http://schemas.microsoft.com/office/drawing/2014/main" xmlns="" id="{3247F105-89DD-4C3A-AC5F-FB6BBF6B145D}"/>
               </a:ext>
             </a:extLst>
           </p:cNvPr>
@@ -6632,6 +6721,32 @@
           </a:p>
         </p:txBody>
       </p:sp>
+      <p:pic>
+        <p:nvPicPr>
+          <p:cNvPr id="6" name="Inhaltsplatzhalter 5"/>
+          <p:cNvPicPr>
+            <a:picLocks noGrp="1" noChangeAspect="1"/>
+          </p:cNvPicPr>
+          <p:nvPr>
+            <p:ph idx="1"/>
+          </p:nvPr>
+        </p:nvPicPr>
+        <p:blipFill>
+          <a:blip r:embed="rId2"/>
+          <a:stretch>
+            <a:fillRect/>
+          </a:stretch>
+        </p:blipFill>
+        <p:spPr>
+          <a:xfrm>
+            <a:off x="400656" y="1273175"/>
+            <a:ext cx="9184062" cy="4964113"/>
+          </a:xfrm>
+          <a:prstGeom prst="rect">
+            <a:avLst/>
+          </a:prstGeom>
+        </p:spPr>
+      </p:pic>
     </p:spTree>
     <p:extLst>
       <p:ext uri="{BB962C8B-B14F-4D97-AF65-F5344CB8AC3E}">
@@ -6643,6 +6758,13 @@
     <a:masterClrMapping/>
   </p:clrMapOvr>
   <p:transition/>
+  <p:timing>
+    <p:tnLst>
+      <p:par>
+        <p:cTn id="1" dur="indefinite" restart="never" nodeType="tmRoot"/>
+      </p:par>
+    </p:tnLst>
+  </p:timing>
 </p:sld>
 </file>
 

</xml_diff>